<commit_message>
fix slurm script path after reorg
</commit_message>
<xml_diff>
--- a/slides/meeting_20210820.pptx
+++ b/slides/meeting_20210820.pptx
@@ -126,6 +126,11 @@
       </a:defRPr>
     </a:lvl9pPr>
   </p:defaultTextStyle>
+  <p:extLst>
+    <p:ext uri="{EFAFB233-063F-42B5-8137-9DF3F51BA10A}">
+      <p15:sldGuideLst xmlns:p15="http://schemas.microsoft.com/office/powerpoint/2012/main"/>
+    </p:ext>
+  </p:extLst>
 </p:presentation>
 </file>
 
@@ -276,7 +281,7 @@
           <a:p>
             <a:fld id="{25D4FEC6-8A6D-6148-91CF-B21572470B8E}" type="datetimeFigureOut">
               <a:rPr lang="en-US" smtClean="0"/>
-              <a:t>8/20/21</a:t>
+              <a:t>8/23/21</a:t>
             </a:fld>
             <a:endParaRPr lang="en-US"/>
           </a:p>
@@ -474,7 +479,7 @@
           <a:p>
             <a:fld id="{25D4FEC6-8A6D-6148-91CF-B21572470B8E}" type="datetimeFigureOut">
               <a:rPr lang="en-US" smtClean="0"/>
-              <a:t>8/20/21</a:t>
+              <a:t>8/23/21</a:t>
             </a:fld>
             <a:endParaRPr lang="en-US"/>
           </a:p>
@@ -682,7 +687,7 @@
           <a:p>
             <a:fld id="{25D4FEC6-8A6D-6148-91CF-B21572470B8E}" type="datetimeFigureOut">
               <a:rPr lang="en-US" smtClean="0"/>
-              <a:t>8/20/21</a:t>
+              <a:t>8/23/21</a:t>
             </a:fld>
             <a:endParaRPr lang="en-US"/>
           </a:p>
@@ -880,7 +885,7 @@
           <a:p>
             <a:fld id="{25D4FEC6-8A6D-6148-91CF-B21572470B8E}" type="datetimeFigureOut">
               <a:rPr lang="en-US" smtClean="0"/>
-              <a:t>8/20/21</a:t>
+              <a:t>8/23/21</a:t>
             </a:fld>
             <a:endParaRPr lang="en-US"/>
           </a:p>
@@ -1155,7 +1160,7 @@
           <a:p>
             <a:fld id="{25D4FEC6-8A6D-6148-91CF-B21572470B8E}" type="datetimeFigureOut">
               <a:rPr lang="en-US" smtClean="0"/>
-              <a:t>8/20/21</a:t>
+              <a:t>8/23/21</a:t>
             </a:fld>
             <a:endParaRPr lang="en-US"/>
           </a:p>
@@ -1420,7 +1425,7 @@
           <a:p>
             <a:fld id="{25D4FEC6-8A6D-6148-91CF-B21572470B8E}" type="datetimeFigureOut">
               <a:rPr lang="en-US" smtClean="0"/>
-              <a:t>8/20/21</a:t>
+              <a:t>8/23/21</a:t>
             </a:fld>
             <a:endParaRPr lang="en-US"/>
           </a:p>
@@ -1832,7 +1837,7 @@
           <a:p>
             <a:fld id="{25D4FEC6-8A6D-6148-91CF-B21572470B8E}" type="datetimeFigureOut">
               <a:rPr lang="en-US" smtClean="0"/>
-              <a:t>8/20/21</a:t>
+              <a:t>8/23/21</a:t>
             </a:fld>
             <a:endParaRPr lang="en-US"/>
           </a:p>
@@ -1973,7 +1978,7 @@
           <a:p>
             <a:fld id="{25D4FEC6-8A6D-6148-91CF-B21572470B8E}" type="datetimeFigureOut">
               <a:rPr lang="en-US" smtClean="0"/>
-              <a:t>8/20/21</a:t>
+              <a:t>8/23/21</a:t>
             </a:fld>
             <a:endParaRPr lang="en-US"/>
           </a:p>
@@ -2086,7 +2091,7 @@
           <a:p>
             <a:fld id="{25D4FEC6-8A6D-6148-91CF-B21572470B8E}" type="datetimeFigureOut">
               <a:rPr lang="en-US" smtClean="0"/>
-              <a:t>8/20/21</a:t>
+              <a:t>8/23/21</a:t>
             </a:fld>
             <a:endParaRPr lang="en-US"/>
           </a:p>
@@ -2397,7 +2402,7 @@
           <a:p>
             <a:fld id="{25D4FEC6-8A6D-6148-91CF-B21572470B8E}" type="datetimeFigureOut">
               <a:rPr lang="en-US" smtClean="0"/>
-              <a:t>8/20/21</a:t>
+              <a:t>8/23/21</a:t>
             </a:fld>
             <a:endParaRPr lang="en-US"/>
           </a:p>
@@ -2685,7 +2690,7 @@
           <a:p>
             <a:fld id="{25D4FEC6-8A6D-6148-91CF-B21572470B8E}" type="datetimeFigureOut">
               <a:rPr lang="en-US" smtClean="0"/>
-              <a:t>8/20/21</a:t>
+              <a:t>8/23/21</a:t>
             </a:fld>
             <a:endParaRPr lang="en-US"/>
           </a:p>
@@ -2928,7 +2933,7 @@
             <a:fld id="{25D4FEC6-8A6D-6148-91CF-B21572470B8E}" type="datetimeFigureOut">
               <a:rPr lang="en-US" smtClean="0"/>
               <a:pPr/>
-              <a:t>8/20/21</a:t>
+              <a:t>8/23/21</a:t>
             </a:fld>
             <a:endParaRPr lang="en-US"/>
           </a:p>
@@ -41314,14 +41319,14 @@
           <p:nvPr>
             <p:extLst>
               <p:ext uri="{D42A27DB-BD31-4B8C-83A1-F6EECF244321}">
-                <p14:modId xmlns:p14="http://schemas.microsoft.com/office/powerpoint/2010/main" val="1434391691"/>
+                <p14:modId xmlns:p14="http://schemas.microsoft.com/office/powerpoint/2010/main" val="2764415740"/>
               </p:ext>
             </p:extLst>
           </p:nvPr>
         </p:nvGraphicFramePr>
         <p:xfrm>
           <a:off x="322521" y="1821357"/>
-          <a:ext cx="11546957" cy="2560320"/>
+          <a:ext cx="11546957" cy="3840480"/>
         </p:xfrm>
         <a:graphic>
           <a:graphicData uri="http://schemas.openxmlformats.org/drawingml/2006/table">
@@ -41607,7 +41612,7 @@
                         <a:rPr lang="en-US" sz="3600" dirty="0">
                           <a:latin typeface="Lato" panose="020F0502020204030203" pitchFamily="34" charset="77"/>
                         </a:rPr>
-                        <a:t>🏃🏃</a:t>
+                        <a:t>🟢🟢</a:t>
                       </a:r>
                     </a:p>
                   </a:txBody>
@@ -41652,7 +41657,7 @@
                     <a:p>
                       <a:pPr algn="ctr"/>
                       <a:r>
-                        <a:rPr kumimoji="0" lang="en-US" sz="3600" b="0" i="0" u="none" strike="noStrike" kern="1200" cap="none" spc="0" normalizeH="0" baseline="0" noProof="0">
+                        <a:rPr kumimoji="0" lang="en-US" sz="3600" b="0" i="0" u="none" strike="noStrike" kern="1200" cap="none" spc="0" normalizeH="0" baseline="0" noProof="0" dirty="0">
                           <a:ln>
                             <a:noFill/>
                           </a:ln>
@@ -41712,12 +41717,28 @@
                     <a:bodyPr/>
                     <a:lstStyle/>
                     <a:p>
-                      <a:pPr algn="ctr"/>
+                      <a:pPr marL="0" marR="0" lvl="0" indent="0" algn="ctr" defTabSz="914400" rtl="0" eaLnBrk="1" fontAlgn="auto" latinLnBrk="0" hangingPunct="1">
+                        <a:lnSpc>
+                          <a:spcPct val="100000"/>
+                        </a:lnSpc>
+                        <a:spcBef>
+                          <a:spcPts val="0"/>
+                        </a:spcBef>
+                        <a:spcAft>
+                          <a:spcPts val="0"/>
+                        </a:spcAft>
+                        <a:buClrTx/>
+                        <a:buSzTx/>
+                        <a:buFontTx/>
+                        <a:buNone/>
+                        <a:tabLst/>
+                        <a:defRPr/>
+                      </a:pPr>
                       <a:r>
                         <a:rPr lang="en-US" sz="3600" dirty="0">
                           <a:latin typeface="Lato" panose="020F0502020204030203" pitchFamily="34" charset="77"/>
                         </a:rPr>
-                        <a:t>🏃</a:t>
+                        <a:t>🟢</a:t>
                       </a:r>
                     </a:p>
                   </a:txBody>
@@ -41751,6 +41772,97 @@
                     <a:lstStyle/>
                     <a:p>
                       <a:pPr algn="ctr"/>
+                      <a:endParaRPr lang="en-US" sz="3600" dirty="0">
+                        <a:latin typeface="Lato" panose="020F0502020204030203" pitchFamily="34" charset="77"/>
+                      </a:endParaRPr>
+                    </a:p>
+                  </a:txBody>
+                  <a:tcPr anchor="ctr"/>
+                </a:tc>
+                <a:tc>
+                  <a:txBody>
+                    <a:bodyPr/>
+                    <a:lstStyle/>
+                    <a:p>
+                      <a:pPr algn="ctr"/>
+                      <a:endParaRPr lang="en-US" sz="3600" dirty="0">
+                        <a:latin typeface="Lato" panose="020F0502020204030203" pitchFamily="34" charset="77"/>
+                      </a:endParaRPr>
+                    </a:p>
+                  </a:txBody>
+                  <a:tcPr anchor="ctr"/>
+                </a:tc>
+                <a:tc>
+                  <a:txBody>
+                    <a:bodyPr/>
+                    <a:lstStyle/>
+                    <a:p>
+                      <a:pPr algn="ctr"/>
+                      <a:endParaRPr lang="en-US" sz="3600" dirty="0">
+                        <a:latin typeface="Lato" panose="020F0502020204030203" pitchFamily="34" charset="77"/>
+                      </a:endParaRPr>
+                    </a:p>
+                  </a:txBody>
+                  <a:tcPr anchor="ctr"/>
+                </a:tc>
+                <a:tc>
+                  <a:txBody>
+                    <a:bodyPr/>
+                    <a:lstStyle/>
+                    <a:p>
+                      <a:pPr marL="0" marR="0" lvl="0" indent="0" algn="ctr" defTabSz="914400" rtl="0" eaLnBrk="1" fontAlgn="auto" latinLnBrk="0" hangingPunct="1">
+                        <a:lnSpc>
+                          <a:spcPct val="100000"/>
+                        </a:lnSpc>
+                        <a:spcBef>
+                          <a:spcPts val="0"/>
+                        </a:spcBef>
+                        <a:spcAft>
+                          <a:spcPts val="0"/>
+                        </a:spcAft>
+                        <a:buClrTx/>
+                        <a:buSzTx/>
+                        <a:buFontTx/>
+                        <a:buNone/>
+                        <a:tabLst/>
+                        <a:defRPr/>
+                      </a:pPr>
+                      <a:endParaRPr lang="en-US" sz="3600" dirty="0">
+                        <a:latin typeface="Lato" panose="020F0502020204030203" pitchFamily="34" charset="77"/>
+                      </a:endParaRPr>
+                    </a:p>
+                  </a:txBody>
+                  <a:tcPr anchor="ctr"/>
+                </a:tc>
+                <a:extLst>
+                  <a:ext uri="{0D108BD9-81ED-4DB2-BD59-A6C34878D82A}">
+                    <a16:rowId xmlns:a16="http://schemas.microsoft.com/office/drawing/2014/main" val="3114591712"/>
+                  </a:ext>
+                </a:extLst>
+              </a:tr>
+              <a:tr h="370840">
+                <a:tc>
+                  <a:txBody>
+                    <a:bodyPr/>
+                    <a:lstStyle/>
+                    <a:p>
+                      <a:pPr lvl="1"/>
+                      <a:r>
+                        <a:rPr lang="en-US" sz="3600" b="0" dirty="0">
+                          <a:latin typeface="Lato" panose="020F0502020204030203" pitchFamily="34" charset="77"/>
+                        </a:rPr>
+                        <a:t>March 15</a:t>
+                      </a:r>
+                    </a:p>
+                  </a:txBody>
+                  <a:tcPr anchor="ctr"/>
+                </a:tc>
+                <a:tc>
+                  <a:txBody>
+                    <a:bodyPr/>
+                    <a:lstStyle/>
+                    <a:p>
+                      <a:pPr algn="ctr"/>
                       <a:r>
                         <a:rPr kumimoji="0" lang="en-US" sz="3600" b="0" i="0" u="none" strike="noStrike" kern="1200" cap="none" spc="0" normalizeH="0" baseline="0" noProof="0" dirty="0">
                           <a:ln>
@@ -41812,12 +41924,28 @@
                     <a:bodyPr/>
                     <a:lstStyle/>
                     <a:p>
-                      <a:pPr algn="ctr"/>
+                      <a:pPr marL="0" marR="0" lvl="0" indent="0" algn="ctr" defTabSz="914400" rtl="0" eaLnBrk="1" fontAlgn="auto" latinLnBrk="0" hangingPunct="1">
+                        <a:lnSpc>
+                          <a:spcPct val="100000"/>
+                        </a:lnSpc>
+                        <a:spcBef>
+                          <a:spcPts val="0"/>
+                        </a:spcBef>
+                        <a:spcAft>
+                          <a:spcPts val="0"/>
+                        </a:spcAft>
+                        <a:buClrTx/>
+                        <a:buSzTx/>
+                        <a:buFontTx/>
+                        <a:buNone/>
+                        <a:tabLst/>
+                        <a:defRPr/>
+                      </a:pPr>
                       <a:r>
                         <a:rPr lang="en-US" sz="3600" dirty="0">
                           <a:latin typeface="Lato" panose="020F0502020204030203" pitchFamily="34" charset="77"/>
                         </a:rPr>
-                        <a:t>🏃</a:t>
+                        <a:t>🏃🏃</a:t>
                       </a:r>
                     </a:p>
                   </a:txBody>
@@ -41825,7 +41953,124 @@
                 </a:tc>
                 <a:extLst>
                   <a:ext uri="{0D108BD9-81ED-4DB2-BD59-A6C34878D82A}">
-                    <a16:rowId xmlns:a16="http://schemas.microsoft.com/office/drawing/2014/main" val="3114591712"/>
+                    <a16:rowId xmlns:a16="http://schemas.microsoft.com/office/drawing/2014/main" val="1782466305"/>
+                  </a:ext>
+                </a:extLst>
+              </a:tr>
+              <a:tr h="370840">
+                <a:tc>
+                  <a:txBody>
+                    <a:bodyPr/>
+                    <a:lstStyle/>
+                    <a:p>
+                      <a:pPr lvl="1"/>
+                      <a:r>
+                        <a:rPr lang="en-US" sz="3600" b="0" dirty="0">
+                          <a:latin typeface="Lato" panose="020F0502020204030203" pitchFamily="34" charset="77"/>
+                        </a:rPr>
+                        <a:t>April 15</a:t>
+                      </a:r>
+                    </a:p>
+                  </a:txBody>
+                  <a:tcPr anchor="ctr"/>
+                </a:tc>
+                <a:tc>
+                  <a:txBody>
+                    <a:bodyPr/>
+                    <a:lstStyle/>
+                    <a:p>
+                      <a:pPr algn="ctr"/>
+                      <a:r>
+                        <a:rPr kumimoji="0" lang="en-US" sz="3600" b="0" i="0" u="none" strike="noStrike" kern="1200" cap="none" spc="0" normalizeH="0" baseline="0" noProof="0" dirty="0">
+                          <a:ln>
+                            <a:noFill/>
+                          </a:ln>
+                          <a:solidFill>
+                            <a:prstClr val="black"/>
+                          </a:solidFill>
+                          <a:effectLst/>
+                          <a:uLnTx/>
+                          <a:uFillTx/>
+                          <a:latin typeface="Lato" panose="020F0502020204030203" pitchFamily="34" charset="77"/>
+                          <a:ea typeface="+mn-ea"/>
+                          <a:cs typeface="+mn-cs"/>
+                        </a:rPr>
+                        <a:t>🟢</a:t>
+                      </a:r>
+                      <a:endParaRPr lang="en-US" sz="3600" dirty="0">
+                        <a:latin typeface="Lato" panose="020F0502020204030203" pitchFamily="34" charset="77"/>
+                      </a:endParaRPr>
+                    </a:p>
+                  </a:txBody>
+                  <a:tcPr anchor="ctr"/>
+                </a:tc>
+                <a:tc>
+                  <a:txBody>
+                    <a:bodyPr/>
+                    <a:lstStyle/>
+                    <a:p>
+                      <a:pPr algn="ctr"/>
+                      <a:r>
+                        <a:rPr lang="en-US" sz="3600" dirty="0">
+                          <a:latin typeface="Lato" panose="020F0502020204030203" pitchFamily="34" charset="77"/>
+                        </a:rPr>
+                        <a:t>🟢</a:t>
+                      </a:r>
+                    </a:p>
+                  </a:txBody>
+                  <a:tcPr anchor="ctr"/>
+                </a:tc>
+                <a:tc>
+                  <a:txBody>
+                    <a:bodyPr/>
+                    <a:lstStyle/>
+                    <a:p>
+                      <a:pPr algn="ctr"/>
+                      <a:r>
+                        <a:rPr lang="en-US" sz="3600" dirty="0">
+                          <a:latin typeface="Lato" panose="020F0502020204030203" pitchFamily="34" charset="77"/>
+                        </a:rPr>
+                        <a:t>🟢</a:t>
+                      </a:r>
+                    </a:p>
+                  </a:txBody>
+                  <a:tcPr anchor="ctr"/>
+                </a:tc>
+                <a:tc>
+                  <a:txBody>
+                    <a:bodyPr/>
+                    <a:lstStyle/>
+                    <a:p>
+                      <a:pPr marL="0" marR="0" lvl="0" indent="0" algn="ctr" defTabSz="914400" rtl="0" eaLnBrk="1" fontAlgn="auto" latinLnBrk="0" hangingPunct="1">
+                        <a:lnSpc>
+                          <a:spcPct val="100000"/>
+                        </a:lnSpc>
+                        <a:spcBef>
+                          <a:spcPts val="0"/>
+                        </a:spcBef>
+                        <a:spcAft>
+                          <a:spcPts val="0"/>
+                        </a:spcAft>
+                        <a:buClrTx/>
+                        <a:buSzTx/>
+                        <a:buFontTx/>
+                        <a:buNone/>
+                        <a:tabLst/>
+                        <a:defRPr/>
+                      </a:pPr>
+                      <a:r>
+                        <a:rPr lang="en-US" sz="3600" dirty="0">
+                          <a:latin typeface="Lato" panose="020F0502020204030203" pitchFamily="34" charset="77"/>
+                        </a:rPr>
+                        <a:t>🏃🟢</a:t>
+                      </a:r>
+                    </a:p>
+                  </a:txBody>
+                  <a:tcPr anchor="ctr"/>
+                </a:tc>
+                <a:extLst>
+                  <a:ext uri="{0D108BD9-81ED-4DB2-BD59-A6C34878D82A}">
+                    <a16:rowId xmlns:a16="http://schemas.microsoft.com/office/drawing/2014/main" val="715274055"/>
                   </a:ext>
                 </a:extLst>
               </a:tr>

</xml_diff>